<commit_message>
add Figma UI export image
</commit_message>
<xml_diff>
--- a/LINE在電商領域能提出之新功能.pptx
+++ b/LINE在電商領域能提出之新功能.pptx
@@ -119,6 +119,11 @@
       </a:defRPr>
     </a:lvl9pPr>
   </p:defaultTextStyle>
+  <p:extLst>
+    <p:ext uri="{EFAFB233-063F-42B5-8137-9DF3F51BA10A}">
+      <p15:sldGuideLst xmlns:p15="http://schemas.microsoft.com/office/powerpoint/2012/main"/>
+    </p:ext>
+  </p:extLst>
 </p:presentation>
 </file>
 
@@ -4367,7 +4372,7 @@
           <a:p>
             <a:fld id="{E40AD7CA-D241-4A91-A033-62799EACC562}" type="datetimeFigureOut">
               <a:rPr lang="zh-TW" altLang="en-US" smtClean="0"/>
-              <a:t>2024/1/6</a:t>
+              <a:t>2024/1/7</a:t>
             </a:fld>
             <a:endParaRPr lang="zh-TW" altLang="en-US"/>
           </a:p>
@@ -4697,7 +4702,7 @@
           <a:p>
             <a:fld id="{E40AD7CA-D241-4A91-A033-62799EACC562}" type="datetimeFigureOut">
               <a:rPr lang="zh-TW" altLang="en-US" smtClean="0"/>
-              <a:t>2024/1/6</a:t>
+              <a:t>2024/1/7</a:t>
             </a:fld>
             <a:endParaRPr lang="zh-TW" altLang="en-US"/>
           </a:p>
@@ -4877,7 +4882,7 @@
           <a:p>
             <a:fld id="{E40AD7CA-D241-4A91-A033-62799EACC562}" type="datetimeFigureOut">
               <a:rPr lang="zh-TW" altLang="en-US" smtClean="0"/>
-              <a:t>2024/1/6</a:t>
+              <a:t>2024/1/7</a:t>
             </a:fld>
             <a:endParaRPr lang="zh-TW" altLang="en-US"/>
           </a:p>
@@ -5047,7 +5052,7 @@
           <a:p>
             <a:fld id="{E40AD7CA-D241-4A91-A033-62799EACC562}" type="datetimeFigureOut">
               <a:rPr lang="zh-TW" altLang="en-US" smtClean="0"/>
-              <a:t>2024/1/6</a:t>
+              <a:t>2024/1/7</a:t>
             </a:fld>
             <a:endParaRPr lang="zh-TW" altLang="en-US"/>
           </a:p>
@@ -5324,7 +5329,7 @@
           <a:p>
             <a:fld id="{E40AD7CA-D241-4A91-A033-62799EACC562}" type="datetimeFigureOut">
               <a:rPr lang="zh-TW" altLang="en-US" smtClean="0"/>
-              <a:t>2024/1/6</a:t>
+              <a:t>2024/1/7</a:t>
             </a:fld>
             <a:endParaRPr lang="zh-TW" altLang="en-US"/>
           </a:p>
@@ -5718,7 +5723,7 @@
           <a:p>
             <a:fld id="{E40AD7CA-D241-4A91-A033-62799EACC562}" type="datetimeFigureOut">
               <a:rPr lang="zh-TW" altLang="en-US" smtClean="0"/>
-              <a:t>2024/1/6</a:t>
+              <a:t>2024/1/7</a:t>
             </a:fld>
             <a:endParaRPr lang="zh-TW" altLang="en-US"/>
           </a:p>
@@ -6195,7 +6200,7 @@
           <a:p>
             <a:fld id="{E40AD7CA-D241-4A91-A033-62799EACC562}" type="datetimeFigureOut">
               <a:rPr lang="zh-TW" altLang="en-US" smtClean="0"/>
-              <a:t>2024/1/6</a:t>
+              <a:t>2024/1/7</a:t>
             </a:fld>
             <a:endParaRPr lang="zh-TW" altLang="en-US"/>
           </a:p>
@@ -6313,7 +6318,7 @@
           <a:p>
             <a:fld id="{E40AD7CA-D241-4A91-A033-62799EACC562}" type="datetimeFigureOut">
               <a:rPr lang="zh-TW" altLang="en-US" smtClean="0"/>
-              <a:t>2024/1/6</a:t>
+              <a:t>2024/1/7</a:t>
             </a:fld>
             <a:endParaRPr lang="zh-TW" altLang="en-US"/>
           </a:p>
@@ -6408,7 +6413,7 @@
           <a:p>
             <a:fld id="{E40AD7CA-D241-4A91-A033-62799EACC562}" type="datetimeFigureOut">
               <a:rPr lang="zh-TW" altLang="en-US" smtClean="0"/>
-              <a:t>2024/1/6</a:t>
+              <a:t>2024/1/7</a:t>
             </a:fld>
             <a:endParaRPr lang="zh-TW" altLang="en-US"/>
           </a:p>
@@ -6754,7 +6759,7 @@
           <a:p>
             <a:fld id="{E40AD7CA-D241-4A91-A033-62799EACC562}" type="datetimeFigureOut">
               <a:rPr lang="zh-TW" altLang="en-US" smtClean="0"/>
-              <a:t>2024/1/6</a:t>
+              <a:t>2024/1/7</a:t>
             </a:fld>
             <a:endParaRPr lang="zh-TW" altLang="en-US"/>
           </a:p>
@@ -7142,7 +7147,7 @@
           <a:p>
             <a:fld id="{E40AD7CA-D241-4A91-A033-62799EACC562}" type="datetimeFigureOut">
               <a:rPr lang="zh-TW" altLang="en-US" smtClean="0"/>
-              <a:t>2024/1/6</a:t>
+              <a:t>2024/1/7</a:t>
             </a:fld>
             <a:endParaRPr lang="zh-TW" altLang="en-US"/>
           </a:p>
@@ -7420,7 +7425,7 @@
           <a:p>
             <a:fld id="{E40AD7CA-D241-4A91-A033-62799EACC562}" type="datetimeFigureOut">
               <a:rPr lang="zh-TW" altLang="en-US" smtClean="0"/>
-              <a:t>2024/1/6</a:t>
+              <a:t>2024/1/7</a:t>
             </a:fld>
             <a:endParaRPr lang="zh-TW" altLang="en-US"/>
           </a:p>
@@ -8115,7 +8120,7 @@
           <a:lstStyle/>
           <a:p>
             <a:r>
-              <a:rPr lang="zh-TW" altLang="en-US" dirty="0">
+              <a:rPr lang="zh-TW" altLang="en-US" b="1" dirty="0">
                 <a:latin typeface="微軟正黑體" panose="020B0604030504040204" pitchFamily="34" charset="-120"/>
                 <a:ea typeface="微軟正黑體" panose="020B0604030504040204" pitchFamily="34" charset="-120"/>
               </a:rPr>
@@ -8238,7 +8243,7 @@
           <a:lstStyle/>
           <a:p>
             <a:r>
-              <a:rPr lang="zh-TW" altLang="en-US" dirty="0"/>
+              <a:rPr lang="zh-TW" altLang="en-US" b="1" dirty="0"/>
               <a:t>系統介面</a:t>
             </a:r>
           </a:p>
@@ -8321,7 +8326,7 @@
           <a:lstStyle/>
           <a:p>
             <a:r>
-              <a:rPr lang="zh-TW" altLang="en-US" dirty="0"/>
+              <a:rPr lang="zh-TW" altLang="en-US" b="1" dirty="0"/>
               <a:t>系統架構</a:t>
             </a:r>
           </a:p>
@@ -8733,7 +8738,7 @@
           <a:lstStyle/>
           <a:p>
             <a:r>
-              <a:rPr lang="zh-TW" altLang="en-US" dirty="0"/>
+              <a:rPr lang="zh-TW" altLang="en-US" b="1" dirty="0"/>
               <a:t>收益模式</a:t>
             </a:r>
           </a:p>
@@ -8896,7 +8901,7 @@
           <a:lstStyle/>
           <a:p>
             <a:r>
-              <a:rPr lang="zh-TW" altLang="en-US" dirty="0"/>
+              <a:rPr lang="zh-TW" altLang="en-US" b="1" dirty="0"/>
               <a:t>未來展望</a:t>
             </a:r>
           </a:p>
@@ -9045,7 +9050,7 @@
           <a:lstStyle/>
           <a:p>
             <a:r>
-              <a:rPr lang="zh-TW" altLang="en-US" dirty="0"/>
+              <a:rPr lang="zh-TW" altLang="en-US" b="1" dirty="0"/>
               <a:t>未來展望</a:t>
             </a:r>
           </a:p>
@@ -9168,7 +9173,7 @@
           <a:lstStyle/>
           <a:p>
             <a:r>
-              <a:rPr lang="zh-TW" altLang="en-US" dirty="0"/>
+              <a:rPr lang="zh-TW" altLang="en-US" b="1" dirty="0"/>
               <a:t>資料來源</a:t>
             </a:r>
           </a:p>
@@ -10262,7 +10267,7 @@
           <a:lstStyle/>
           <a:p>
             <a:r>
-              <a:rPr lang="zh-TW" altLang="en-US" dirty="0">
+              <a:rPr lang="zh-TW" altLang="en-US" b="1" dirty="0">
                 <a:latin typeface="微軟正黑體 (本文)"/>
               </a:rPr>
               <a:t>目錄</a:t>
@@ -10727,7 +10732,7 @@
           <a:lstStyle/>
           <a:p>
             <a:r>
-              <a:rPr lang="zh-TW" altLang="en-US" dirty="0">
+              <a:rPr lang="zh-TW" altLang="en-US" b="1" dirty="0">
                 <a:latin typeface="微軟正黑體 (本文)"/>
               </a:rPr>
               <a:t>主題方向</a:t>
@@ -11709,7 +11714,7 @@
           <a:lstStyle/>
           <a:p>
             <a:r>
-              <a:rPr lang="zh-TW" altLang="en-US" dirty="0">
+              <a:rPr lang="zh-TW" altLang="en-US" b="1" dirty="0">
                 <a:latin typeface="微軟正黑體 (本文)"/>
               </a:rPr>
               <a:t>主題方向</a:t>
@@ -12586,7 +12591,7 @@
           <a:lstStyle/>
           <a:p>
             <a:r>
-              <a:rPr lang="zh-TW" altLang="en-US" dirty="0">
+              <a:rPr lang="zh-TW" altLang="en-US" b="1" dirty="0">
                 <a:latin typeface="微軟正黑體 (本文)"/>
               </a:rPr>
               <a:t>背景知識文獻探討</a:t>
@@ -12962,7 +12967,7 @@
           <a:lstStyle/>
           <a:p>
             <a:r>
-              <a:rPr lang="zh-TW" altLang="en-US" dirty="0">
+              <a:rPr lang="zh-TW" altLang="en-US" b="1" dirty="0">
                 <a:latin typeface="微軟正黑體 (本文)"/>
               </a:rPr>
               <a:t>背景知識文獻探討</a:t>
@@ -13153,7 +13158,7 @@
           <a:lstStyle/>
           <a:p>
             <a:r>
-              <a:rPr lang="zh-TW" altLang="en-US" dirty="0">
+              <a:rPr lang="zh-TW" altLang="en-US" b="1" dirty="0">
                 <a:latin typeface="微軟正黑體 (本文)"/>
               </a:rPr>
               <a:t>背景知識文獻探討</a:t>
@@ -13362,7 +13367,7 @@
           <a:lstStyle/>
           <a:p>
             <a:r>
-              <a:rPr lang="zh-TW" altLang="en-US" dirty="0">
+              <a:rPr lang="zh-TW" altLang="en-US" b="1" dirty="0">
                 <a:latin typeface="微軟正黑體 (本文)"/>
               </a:rPr>
               <a:t>背景知識文獻探討</a:t>
@@ -13495,7 +13500,7 @@
           <a:lstStyle/>
           <a:p>
             <a:r>
-              <a:rPr lang="zh-TW" altLang="en-US" dirty="0">
+              <a:rPr lang="zh-TW" altLang="en-US" b="1" dirty="0">
                 <a:latin typeface="微軟正黑體" panose="020B0604030504040204" pitchFamily="34" charset="-120"/>
                 <a:ea typeface="微軟正黑體" panose="020B0604030504040204" pitchFamily="34" charset="-120"/>
               </a:rPr>

</xml_diff>